<commit_message>
add connection confirmation, clean file system
</commit_message>
<xml_diff>
--- a/DemoPresentation - first draft.pptx
+++ b/DemoPresentation - first draft.pptx
@@ -274,7 +274,7 @@
           <a:p>
             <a:fld id="{2F3E8B1C-86EF-43CF-8304-249481088644}" type="datetimeFigureOut">
               <a:rPr lang="en-US" smtClean="0"/>
-              <a:t>2/9/2021</a:t>
+              <a:t>2/11/2021</a:t>
             </a:fld>
             <a:endParaRPr lang="en-US"/>
           </a:p>
@@ -472,7 +472,7 @@
           <a:p>
             <a:fld id="{2F3E8B1C-86EF-43CF-8304-249481088644}" type="datetimeFigureOut">
               <a:rPr lang="en-US" smtClean="0"/>
-              <a:t>2/9/2021</a:t>
+              <a:t>2/11/2021</a:t>
             </a:fld>
             <a:endParaRPr lang="en-US"/>
           </a:p>
@@ -680,7 +680,7 @@
           <a:p>
             <a:fld id="{2F3E8B1C-86EF-43CF-8304-249481088644}" type="datetimeFigureOut">
               <a:rPr lang="en-US" smtClean="0"/>
-              <a:t>2/9/2021</a:t>
+              <a:t>2/11/2021</a:t>
             </a:fld>
             <a:endParaRPr lang="en-US"/>
           </a:p>
@@ -878,7 +878,7 @@
           <a:p>
             <a:fld id="{2F3E8B1C-86EF-43CF-8304-249481088644}" type="datetimeFigureOut">
               <a:rPr lang="en-US" smtClean="0"/>
-              <a:t>2/9/2021</a:t>
+              <a:t>2/11/2021</a:t>
             </a:fld>
             <a:endParaRPr lang="en-US"/>
           </a:p>
@@ -1153,7 +1153,7 @@
           <a:p>
             <a:fld id="{2F3E8B1C-86EF-43CF-8304-249481088644}" type="datetimeFigureOut">
               <a:rPr lang="en-US" smtClean="0"/>
-              <a:t>2/9/2021</a:t>
+              <a:t>2/11/2021</a:t>
             </a:fld>
             <a:endParaRPr lang="en-US"/>
           </a:p>
@@ -1423,7 +1423,7 @@
           <a:p>
             <a:fld id="{2F3E8B1C-86EF-43CF-8304-249481088644}" type="datetimeFigureOut">
               <a:rPr lang="en-US" smtClean="0"/>
-              <a:t>2/9/2021</a:t>
+              <a:t>2/11/2021</a:t>
             </a:fld>
             <a:endParaRPr lang="en-US"/>
           </a:p>
@@ -1843,7 +1843,7 @@
           <a:p>
             <a:fld id="{2F3E8B1C-86EF-43CF-8304-249481088644}" type="datetimeFigureOut">
               <a:rPr lang="en-US" smtClean="0"/>
-              <a:t>2/9/2021</a:t>
+              <a:t>2/11/2021</a:t>
             </a:fld>
             <a:endParaRPr lang="en-US"/>
           </a:p>
@@ -1984,7 +1984,7 @@
           <a:p>
             <a:fld id="{2F3E8B1C-86EF-43CF-8304-249481088644}" type="datetimeFigureOut">
               <a:rPr lang="en-US" smtClean="0"/>
-              <a:t>2/9/2021</a:t>
+              <a:t>2/11/2021</a:t>
             </a:fld>
             <a:endParaRPr lang="en-US"/>
           </a:p>
@@ -2097,7 +2097,7 @@
           <a:p>
             <a:fld id="{2F3E8B1C-86EF-43CF-8304-249481088644}" type="datetimeFigureOut">
               <a:rPr lang="en-US" smtClean="0"/>
-              <a:t>2/9/2021</a:t>
+              <a:t>2/11/2021</a:t>
             </a:fld>
             <a:endParaRPr lang="en-US"/>
           </a:p>
@@ -2408,7 +2408,7 @@
           <a:p>
             <a:fld id="{2F3E8B1C-86EF-43CF-8304-249481088644}" type="datetimeFigureOut">
               <a:rPr lang="en-US" smtClean="0"/>
-              <a:t>2/9/2021</a:t>
+              <a:t>2/11/2021</a:t>
             </a:fld>
             <a:endParaRPr lang="en-US"/>
           </a:p>
@@ -2696,7 +2696,7 @@
           <a:p>
             <a:fld id="{2F3E8B1C-86EF-43CF-8304-249481088644}" type="datetimeFigureOut">
               <a:rPr lang="en-US" smtClean="0"/>
-              <a:t>2/9/2021</a:t>
+              <a:t>2/11/2021</a:t>
             </a:fld>
             <a:endParaRPr lang="en-US"/>
           </a:p>
@@ -2937,7 +2937,7 @@
             <a:fld id="{2F3E8B1C-86EF-43CF-8304-249481088644}" type="datetimeFigureOut">
               <a:rPr lang="en-US" smtClean="0"/>
               <a:pPr/>
-              <a:t>2/9/2021</a:t>
+              <a:t>2/11/2021</a:t>
             </a:fld>
             <a:endParaRPr lang="en-US" dirty="0"/>
           </a:p>
@@ -5112,6 +5112,18 @@
             </a:r>
           </a:p>
           <a:p>
+            <a:r>
+              <a:rPr lang="en-GB" dirty="0"/>
+              <a:t>Methodology: </a:t>
+            </a:r>
+          </a:p>
+          <a:p>
+            <a:r>
+              <a:rPr lang="en-GB" dirty="0"/>
+              <a:t>System: </a:t>
+            </a:r>
+          </a:p>
+          <a:p>
             <a:endParaRPr lang="en-GB" dirty="0"/>
           </a:p>
         </p:txBody>
@@ -5841,7 +5853,7 @@
                   <a:schemeClr val="bg1"/>
                 </a:solidFill>
               </a:rPr>
-              <a:t>Key Logger</a:t>
+              <a:t>Key Logger (including start/stop commands)</a:t>
             </a:r>
           </a:p>
           <a:p>

</xml_diff>